<commit_message>
minor changes to refresh Fe analysis for high energy runs
Former-commit-id: 938aeced7552f6bb90f36efd53745f48a89afc37
</commit_message>
<xml_diff>
--- a/2018April/Working2018.pptx
+++ b/2018April/Working2018.pptx
@@ -5,12 +5,13 @@
     <p:sldMasterId id="2147483648" r:id="rId1"/>
   </p:sldMasterIdLst>
   <p:notesMasterIdLst>
-    <p:notesMasterId r:id="rId5"/>
+    <p:notesMasterId r:id="rId6"/>
   </p:notesMasterIdLst>
   <p:sldIdLst>
     <p:sldId id="256" r:id="rId2"/>
     <p:sldId id="259" r:id="rId3"/>
     <p:sldId id="309" r:id="rId4"/>
+    <p:sldId id="310" r:id="rId5"/>
   </p:sldIdLst>
   <p:sldSz cx="6858000" cy="9144000" type="screen4x3"/>
   <p:notesSz cx="6858000" cy="9144000"/>
@@ -194,7 +195,7 @@
           <a:p>
             <a:fld id="{E87E9B2F-430F-4F06-B73A-3E686DF7F97D}" type="datetimeFigureOut">
               <a:rPr lang="en-GB" smtClean="0"/>
-              <a:t>22/03/2018</a:t>
+              <a:t>23/03/2018</a:t>
             </a:fld>
             <a:endParaRPr lang="en-GB"/>
           </a:p>
@@ -643,7 +644,7 @@
           <a:p>
             <a:fld id="{103F0B6B-0F34-4B60-AA46-B717113E1AE3}" type="datetimeFigureOut">
               <a:rPr lang="en-GB" smtClean="0"/>
-              <a:t>22/03/2018</a:t>
+              <a:t>23/03/2018</a:t>
             </a:fld>
             <a:endParaRPr lang="en-GB"/>
           </a:p>
@@ -813,7 +814,7 @@
           <a:p>
             <a:fld id="{103F0B6B-0F34-4B60-AA46-B717113E1AE3}" type="datetimeFigureOut">
               <a:rPr lang="en-GB" smtClean="0"/>
-              <a:t>22/03/2018</a:t>
+              <a:t>23/03/2018</a:t>
             </a:fld>
             <a:endParaRPr lang="en-GB"/>
           </a:p>
@@ -993,7 +994,7 @@
           <a:p>
             <a:fld id="{103F0B6B-0F34-4B60-AA46-B717113E1AE3}" type="datetimeFigureOut">
               <a:rPr lang="en-GB" smtClean="0"/>
-              <a:t>22/03/2018</a:t>
+              <a:t>23/03/2018</a:t>
             </a:fld>
             <a:endParaRPr lang="en-GB"/>
           </a:p>
@@ -1163,7 +1164,7 @@
           <a:p>
             <a:fld id="{103F0B6B-0F34-4B60-AA46-B717113E1AE3}" type="datetimeFigureOut">
               <a:rPr lang="en-GB" smtClean="0"/>
-              <a:t>22/03/2018</a:t>
+              <a:t>23/03/2018</a:t>
             </a:fld>
             <a:endParaRPr lang="en-GB"/>
           </a:p>
@@ -1409,7 +1410,7 @@
           <a:p>
             <a:fld id="{103F0B6B-0F34-4B60-AA46-B717113E1AE3}" type="datetimeFigureOut">
               <a:rPr lang="en-GB" smtClean="0"/>
-              <a:t>22/03/2018</a:t>
+              <a:t>23/03/2018</a:t>
             </a:fld>
             <a:endParaRPr lang="en-GB"/>
           </a:p>
@@ -1697,7 +1698,7 @@
           <a:p>
             <a:fld id="{103F0B6B-0F34-4B60-AA46-B717113E1AE3}" type="datetimeFigureOut">
               <a:rPr lang="en-GB" smtClean="0"/>
-              <a:t>22/03/2018</a:t>
+              <a:t>23/03/2018</a:t>
             </a:fld>
             <a:endParaRPr lang="en-GB"/>
           </a:p>
@@ -2119,7 +2120,7 @@
           <a:p>
             <a:fld id="{103F0B6B-0F34-4B60-AA46-B717113E1AE3}" type="datetimeFigureOut">
               <a:rPr lang="en-GB" smtClean="0"/>
-              <a:t>22/03/2018</a:t>
+              <a:t>23/03/2018</a:t>
             </a:fld>
             <a:endParaRPr lang="en-GB"/>
           </a:p>
@@ -2237,7 +2238,7 @@
           <a:p>
             <a:fld id="{103F0B6B-0F34-4B60-AA46-B717113E1AE3}" type="datetimeFigureOut">
               <a:rPr lang="en-GB" smtClean="0"/>
-              <a:t>22/03/2018</a:t>
+              <a:t>23/03/2018</a:t>
             </a:fld>
             <a:endParaRPr lang="en-GB"/>
           </a:p>
@@ -2332,7 +2333,7 @@
           <a:p>
             <a:fld id="{103F0B6B-0F34-4B60-AA46-B717113E1AE3}" type="datetimeFigureOut">
               <a:rPr lang="en-GB" smtClean="0"/>
-              <a:t>22/03/2018</a:t>
+              <a:t>23/03/2018</a:t>
             </a:fld>
             <a:endParaRPr lang="en-GB"/>
           </a:p>
@@ -2609,7 +2610,7 @@
           <a:p>
             <a:fld id="{103F0B6B-0F34-4B60-AA46-B717113E1AE3}" type="datetimeFigureOut">
               <a:rPr lang="en-GB" smtClean="0"/>
-              <a:t>22/03/2018</a:t>
+              <a:t>23/03/2018</a:t>
             </a:fld>
             <a:endParaRPr lang="en-GB"/>
           </a:p>
@@ -2862,7 +2863,7 @@
           <a:p>
             <a:fld id="{103F0B6B-0F34-4B60-AA46-B717113E1AE3}" type="datetimeFigureOut">
               <a:rPr lang="en-GB" smtClean="0"/>
-              <a:t>22/03/2018</a:t>
+              <a:t>23/03/2018</a:t>
             </a:fld>
             <a:endParaRPr lang="en-GB"/>
           </a:p>
@@ -3075,7 +3076,7 @@
           <a:p>
             <a:fld id="{103F0B6B-0F34-4B60-AA46-B717113E1AE3}" type="datetimeFigureOut">
               <a:rPr lang="en-GB" smtClean="0"/>
-              <a:t>22/03/2018</a:t>
+              <a:t>23/03/2018</a:t>
             </a:fld>
             <a:endParaRPr lang="en-GB"/>
           </a:p>
@@ -11882,6 +11883,396 @@
     <p:extLst>
       <p:ext uri="{BB962C8B-B14F-4D97-AF65-F5344CB8AC3E}">
         <p14:creationId xmlns:p14="http://schemas.microsoft.com/office/powerpoint/2010/main" val="3409561478"/>
+      </p:ext>
+    </p:extLst>
+  </p:cSld>
+  <p:clrMapOvr>
+    <a:masterClrMapping/>
+  </p:clrMapOvr>
+</p:sld>
+</file>
+
+<file path=ppt/slides/slide4.xml><?xml version="1.0" encoding="utf-8"?>
+<p:sld xmlns:a="http://schemas.openxmlformats.org/drawingml/2006/main" xmlns:r="http://schemas.openxmlformats.org/officeDocument/2006/relationships" xmlns:p="http://schemas.openxmlformats.org/presentationml/2006/main">
+  <p:cSld>
+    <p:spTree>
+      <p:nvGrpSpPr>
+        <p:cNvPr id="1" name=""/>
+        <p:cNvGrpSpPr/>
+        <p:nvPr/>
+      </p:nvGrpSpPr>
+      <p:grpSpPr>
+        <a:xfrm>
+          <a:off x="0" y="0"/>
+          <a:ext cx="0" cy="0"/>
+          <a:chOff x="0" y="0"/>
+          <a:chExt cx="0" cy="0"/>
+        </a:xfrm>
+      </p:grpSpPr>
+      <p:sp>
+        <p:nvSpPr>
+          <p:cNvPr id="2" name="Title 1"/>
+          <p:cNvSpPr>
+            <a:spLocks noGrp="1"/>
+          </p:cNvSpPr>
+          <p:nvPr>
+            <p:ph type="title"/>
+          </p:nvPr>
+        </p:nvSpPr>
+        <p:spPr>
+          <a:xfrm>
+            <a:off x="342900" y="366184"/>
+            <a:ext cx="6172200" cy="749432"/>
+          </a:xfrm>
+        </p:spPr>
+        <p:txBody>
+          <a:bodyPr>
+            <a:normAutofit/>
+          </a:bodyPr>
+          <a:lstStyle/>
+          <a:p>
+            <a:r>
+              <a:rPr lang="en-GB" sz="2400" dirty="0" smtClean="0"/>
+              <a:t>Lost intensity in GN direction (000-&gt;1/2,1/2,0)?</a:t>
+            </a:r>
+            <a:endParaRPr lang="en-GB" sz="2400" dirty="0"/>
+          </a:p>
+        </p:txBody>
+      </p:sp>
+      <p:pic>
+        <p:nvPicPr>
+          <p:cNvPr id="1026" name="Picture 2"/>
+          <p:cNvPicPr>
+            <a:picLocks noChangeAspect="1" noChangeArrowheads="1"/>
+          </p:cNvPicPr>
+          <p:nvPr/>
+        </p:nvPicPr>
+        <p:blipFill>
+          <a:blip r:embed="rId2">
+            <a:extLst>
+              <a:ext uri="{28A0092B-C50C-407E-A947-70E740481C1C}">
+                <a14:useLocalDpi xmlns:a14="http://schemas.microsoft.com/office/drawing/2010/main" val="0"/>
+              </a:ext>
+            </a:extLst>
+          </a:blip>
+          <a:srcRect/>
+          <a:stretch>
+            <a:fillRect/>
+          </a:stretch>
+        </p:blipFill>
+        <p:spPr bwMode="auto">
+          <a:xfrm>
+            <a:off x="116632" y="1151684"/>
+            <a:ext cx="3265878" cy="2447948"/>
+          </a:xfrm>
+          <a:prstGeom prst="rect">
+            <a:avLst/>
+          </a:prstGeom>
+          <a:noFill/>
+          <a:ln>
+            <a:noFill/>
+          </a:ln>
+          <a:effectLst/>
+          <a:extLst>
+            <a:ext uri="{909E8E84-426E-40DD-AFC4-6F175D3DCCD1}">
+              <a14:hiddenFill xmlns:a14="http://schemas.microsoft.com/office/drawing/2010/main">
+                <a:solidFill>
+                  <a:schemeClr val="accent1"/>
+                </a:solidFill>
+              </a14:hiddenFill>
+            </a:ext>
+            <a:ext uri="{91240B29-F687-4F45-9708-019B960494DF}">
+              <a14:hiddenLine xmlns:a14="http://schemas.microsoft.com/office/drawing/2010/main" w="9525">
+                <a:solidFill>
+                  <a:schemeClr val="tx1"/>
+                </a:solidFill>
+                <a:miter lim="800000"/>
+                <a:headEnd/>
+                <a:tailEnd/>
+              </a14:hiddenLine>
+            </a:ext>
+            <a:ext uri="{AF507438-7753-43E0-B8FC-AC1667EBCBE1}">
+              <a14:hiddenEffects xmlns:a14="http://schemas.microsoft.com/office/drawing/2010/main">
+                <a:effectLst>
+                  <a:outerShdw dist="35921" dir="2700000" algn="ctr" rotWithShape="0">
+                    <a:schemeClr val="bg2"/>
+                  </a:outerShdw>
+                </a:effectLst>
+              </a14:hiddenEffects>
+            </a:ext>
+          </a:extLst>
+        </p:spPr>
+      </p:pic>
+      <p:pic>
+        <p:nvPicPr>
+          <p:cNvPr id="1027" name="Picture 3"/>
+          <p:cNvPicPr>
+            <a:picLocks noChangeAspect="1" noChangeArrowheads="1"/>
+          </p:cNvPicPr>
+          <p:nvPr/>
+        </p:nvPicPr>
+        <p:blipFill>
+          <a:blip r:embed="rId3">
+            <a:extLst>
+              <a:ext uri="{28A0092B-C50C-407E-A947-70E740481C1C}">
+                <a14:useLocalDpi xmlns:a14="http://schemas.microsoft.com/office/drawing/2010/main" val="0"/>
+              </a:ext>
+            </a:extLst>
+          </a:blip>
+          <a:srcRect/>
+          <a:stretch>
+            <a:fillRect/>
+          </a:stretch>
+        </p:blipFill>
+        <p:spPr bwMode="auto">
+          <a:xfrm>
+            <a:off x="3260575" y="1008824"/>
+            <a:ext cx="3408785" cy="2555064"/>
+          </a:xfrm>
+          <a:prstGeom prst="rect">
+            <a:avLst/>
+          </a:prstGeom>
+          <a:noFill/>
+          <a:ln>
+            <a:noFill/>
+          </a:ln>
+          <a:effectLst/>
+          <a:extLst>
+            <a:ext uri="{909E8E84-426E-40DD-AFC4-6F175D3DCCD1}">
+              <a14:hiddenFill xmlns:a14="http://schemas.microsoft.com/office/drawing/2010/main">
+                <a:solidFill>
+                  <a:schemeClr val="accent1"/>
+                </a:solidFill>
+              </a14:hiddenFill>
+            </a:ext>
+            <a:ext uri="{91240B29-F687-4F45-9708-019B960494DF}">
+              <a14:hiddenLine xmlns:a14="http://schemas.microsoft.com/office/drawing/2010/main" w="9525">
+                <a:solidFill>
+                  <a:schemeClr val="tx1"/>
+                </a:solidFill>
+                <a:miter lim="800000"/>
+                <a:headEnd/>
+                <a:tailEnd/>
+              </a14:hiddenLine>
+            </a:ext>
+            <a:ext uri="{AF507438-7753-43E0-B8FC-AC1667EBCBE1}">
+              <a14:hiddenEffects xmlns:a14="http://schemas.microsoft.com/office/drawing/2010/main">
+                <a:effectLst>
+                  <a:outerShdw dist="35921" dir="2700000" algn="ctr" rotWithShape="0">
+                    <a:schemeClr val="bg2"/>
+                  </a:outerShdw>
+                </a:effectLst>
+              </a14:hiddenEffects>
+            </a:ext>
+          </a:extLst>
+        </p:spPr>
+      </p:pic>
+      <p:pic>
+        <p:nvPicPr>
+          <p:cNvPr id="1028" name="Picture 4"/>
+          <p:cNvPicPr>
+            <a:picLocks noChangeAspect="1" noChangeArrowheads="1"/>
+          </p:cNvPicPr>
+          <p:nvPr/>
+        </p:nvPicPr>
+        <p:blipFill>
+          <a:blip r:embed="rId4">
+            <a:extLst>
+              <a:ext uri="{28A0092B-C50C-407E-A947-70E740481C1C}">
+                <a14:useLocalDpi xmlns:a14="http://schemas.microsoft.com/office/drawing/2010/main" val="0"/>
+              </a:ext>
+            </a:extLst>
+          </a:blip>
+          <a:srcRect/>
+          <a:stretch>
+            <a:fillRect/>
+          </a:stretch>
+        </p:blipFill>
+        <p:spPr bwMode="auto">
+          <a:xfrm>
+            <a:off x="116632" y="3851920"/>
+            <a:ext cx="3715767" cy="3235871"/>
+          </a:xfrm>
+          <a:prstGeom prst="rect">
+            <a:avLst/>
+          </a:prstGeom>
+          <a:noFill/>
+          <a:ln>
+            <a:noFill/>
+          </a:ln>
+          <a:effectLst/>
+          <a:extLst>
+            <a:ext uri="{909E8E84-426E-40DD-AFC4-6F175D3DCCD1}">
+              <a14:hiddenFill xmlns:a14="http://schemas.microsoft.com/office/drawing/2010/main">
+                <a:solidFill>
+                  <a:schemeClr val="accent1"/>
+                </a:solidFill>
+              </a14:hiddenFill>
+            </a:ext>
+            <a:ext uri="{91240B29-F687-4F45-9708-019B960494DF}">
+              <a14:hiddenLine xmlns:a14="http://schemas.microsoft.com/office/drawing/2010/main" w="9525">
+                <a:solidFill>
+                  <a:schemeClr val="tx1"/>
+                </a:solidFill>
+                <a:miter lim="800000"/>
+                <a:headEnd/>
+                <a:tailEnd/>
+              </a14:hiddenLine>
+            </a:ext>
+            <a:ext uri="{AF507438-7753-43E0-B8FC-AC1667EBCBE1}">
+              <a14:hiddenEffects xmlns:a14="http://schemas.microsoft.com/office/drawing/2010/main">
+                <a:effectLst>
+                  <a:outerShdw dist="35921" dir="2700000" algn="ctr" rotWithShape="0">
+                    <a:schemeClr val="bg2"/>
+                  </a:outerShdw>
+                </a:effectLst>
+              </a14:hiddenEffects>
+            </a:ext>
+          </a:extLst>
+        </p:spPr>
+      </p:pic>
+      <p:sp>
+        <p:nvSpPr>
+          <p:cNvPr id="4" name="TextBox 3"/>
+          <p:cNvSpPr txBox="1"/>
+          <p:nvPr/>
+        </p:nvSpPr>
+        <p:spPr>
+          <a:xfrm>
+            <a:off x="3789040" y="3667254"/>
+            <a:ext cx="592726" cy="369332"/>
+          </a:xfrm>
+          <a:prstGeom prst="rect">
+            <a:avLst/>
+          </a:prstGeom>
+          <a:noFill/>
+        </p:spPr>
+        <p:txBody>
+          <a:bodyPr wrap="none" rtlCol="0">
+            <a:spAutoFit/>
+          </a:bodyPr>
+          <a:lstStyle/>
+          <a:p>
+            <a:r>
+              <a:rPr lang="en-GB" dirty="0" smtClean="0"/>
+              <a:t>DFT:</a:t>
+            </a:r>
+            <a:endParaRPr lang="en-GB" dirty="0"/>
+          </a:p>
+        </p:txBody>
+      </p:sp>
+      <p:pic>
+        <p:nvPicPr>
+          <p:cNvPr id="1030" name="Picture 6"/>
+          <p:cNvPicPr>
+            <a:picLocks noChangeAspect="1" noChangeArrowheads="1"/>
+          </p:cNvPicPr>
+          <p:nvPr/>
+        </p:nvPicPr>
+        <p:blipFill>
+          <a:blip r:embed="rId5">
+            <a:extLst>
+              <a:ext uri="{28A0092B-C50C-407E-A947-70E740481C1C}">
+                <a14:useLocalDpi xmlns:a14="http://schemas.microsoft.com/office/drawing/2010/main" val="0"/>
+              </a:ext>
+            </a:extLst>
+          </a:blip>
+          <a:srcRect/>
+          <a:stretch>
+            <a:fillRect/>
+          </a:stretch>
+        </p:blipFill>
+        <p:spPr bwMode="auto">
+          <a:xfrm>
+            <a:off x="3501007" y="4067944"/>
+            <a:ext cx="3305815" cy="2952328"/>
+          </a:xfrm>
+          <a:prstGeom prst="rect">
+            <a:avLst/>
+          </a:prstGeom>
+          <a:noFill/>
+          <a:ln>
+            <a:noFill/>
+          </a:ln>
+          <a:effectLst/>
+          <a:extLst>
+            <a:ext uri="{909E8E84-426E-40DD-AFC4-6F175D3DCCD1}">
+              <a14:hiddenFill xmlns:a14="http://schemas.microsoft.com/office/drawing/2010/main">
+                <a:solidFill>
+                  <a:schemeClr val="accent1"/>
+                </a:solidFill>
+              </a14:hiddenFill>
+            </a:ext>
+            <a:ext uri="{91240B29-F687-4F45-9708-019B960494DF}">
+              <a14:hiddenLine xmlns:a14="http://schemas.microsoft.com/office/drawing/2010/main" w="9525">
+                <a:solidFill>
+                  <a:schemeClr val="tx1"/>
+                </a:solidFill>
+                <a:miter lim="800000"/>
+                <a:headEnd/>
+                <a:tailEnd/>
+              </a14:hiddenLine>
+            </a:ext>
+            <a:ext uri="{AF507438-7753-43E0-B8FC-AC1667EBCBE1}">
+              <a14:hiddenEffects xmlns:a14="http://schemas.microsoft.com/office/drawing/2010/main">
+                <a:effectLst>
+                  <a:outerShdw dist="35921" dir="2700000" algn="ctr" rotWithShape="0">
+                    <a:schemeClr val="bg2"/>
+                  </a:outerShdw>
+                </a:effectLst>
+              </a14:hiddenEffects>
+            </a:ext>
+          </a:extLst>
+        </p:spPr>
+      </p:pic>
+      <p:sp>
+        <p:nvSpPr>
+          <p:cNvPr id="5" name="TextBox 4"/>
+          <p:cNvSpPr txBox="1"/>
+          <p:nvPr/>
+        </p:nvSpPr>
+        <p:spPr>
+          <a:xfrm>
+            <a:off x="339024" y="6516215"/>
+            <a:ext cx="2821093" cy="276999"/>
+          </a:xfrm>
+          <a:prstGeom prst="rect">
+            <a:avLst/>
+          </a:prstGeom>
+          <a:solidFill>
+            <a:schemeClr val="bg1"/>
+          </a:solidFill>
+        </p:spPr>
+        <p:txBody>
+          <a:bodyPr wrap="none" rtlCol="0">
+            <a:spAutoFit/>
+          </a:bodyPr>
+          <a:lstStyle/>
+          <a:p>
+            <a:r>
+              <a:rPr lang="en-GB" sz="1200" dirty="0" smtClean="0"/>
+              <a:t>Removed </a:t>
+            </a:r>
+            <a:r>
+              <a:rPr lang="en-GB" sz="1200" dirty="0" err="1" smtClean="0"/>
+              <a:t>bg</a:t>
+            </a:r>
+            <a:r>
+              <a:rPr lang="en-GB" sz="1200" dirty="0" smtClean="0"/>
+              <a:t> in [-3-2.5] range, fixed </a:t>
+            </a:r>
+            <a:r>
+              <a:rPr lang="en-GB" sz="1200" dirty="0" err="1" smtClean="0"/>
+              <a:t>MagFF</a:t>
+            </a:r>
+            <a:endParaRPr lang="en-GB" sz="1200" dirty="0"/>
+          </a:p>
+        </p:txBody>
+      </p:sp>
+    </p:spTree>
+    <p:extLst>
+      <p:ext uri="{BB962C8B-B14F-4D97-AF65-F5344CB8AC3E}">
+        <p14:creationId xmlns:p14="http://schemas.microsoft.com/office/powerpoint/2010/main" val="1522714092"/>
       </p:ext>
     </p:extLst>
   </p:cSld>

</xml_diff>

<commit_message>
Changes related to fitting sw for Ei800
Former-commit-id: f2136487767a38e70a05ac4244352e66a71bbb67
</commit_message>
<xml_diff>
--- a/2018April/Working2018.pptx
+++ b/2018April/Working2018.pptx
@@ -5,13 +5,14 @@
     <p:sldMasterId id="2147483648" r:id="rId1"/>
   </p:sldMasterIdLst>
   <p:notesMasterIdLst>
-    <p:notesMasterId r:id="rId6"/>
+    <p:notesMasterId r:id="rId7"/>
   </p:notesMasterIdLst>
   <p:sldIdLst>
     <p:sldId id="256" r:id="rId2"/>
     <p:sldId id="259" r:id="rId3"/>
     <p:sldId id="309" r:id="rId4"/>
     <p:sldId id="310" r:id="rId5"/>
+    <p:sldId id="311" r:id="rId6"/>
   </p:sldIdLst>
   <p:sldSz cx="6858000" cy="9144000" type="screen4x3"/>
   <p:notesSz cx="6858000" cy="9144000"/>
@@ -195,7 +196,7 @@
           <a:p>
             <a:fld id="{E87E9B2F-430F-4F06-B73A-3E686DF7F97D}" type="datetimeFigureOut">
               <a:rPr lang="en-GB" smtClean="0"/>
-              <a:t>23/03/2018</a:t>
+              <a:t>09/07/2018</a:t>
             </a:fld>
             <a:endParaRPr lang="en-GB"/>
           </a:p>
@@ -644,7 +645,7 @@
           <a:p>
             <a:fld id="{103F0B6B-0F34-4B60-AA46-B717113E1AE3}" type="datetimeFigureOut">
               <a:rPr lang="en-GB" smtClean="0"/>
-              <a:t>23/03/2018</a:t>
+              <a:t>09/07/2018</a:t>
             </a:fld>
             <a:endParaRPr lang="en-GB"/>
           </a:p>
@@ -814,7 +815,7 @@
           <a:p>
             <a:fld id="{103F0B6B-0F34-4B60-AA46-B717113E1AE3}" type="datetimeFigureOut">
               <a:rPr lang="en-GB" smtClean="0"/>
-              <a:t>23/03/2018</a:t>
+              <a:t>09/07/2018</a:t>
             </a:fld>
             <a:endParaRPr lang="en-GB"/>
           </a:p>
@@ -994,7 +995,7 @@
           <a:p>
             <a:fld id="{103F0B6B-0F34-4B60-AA46-B717113E1AE3}" type="datetimeFigureOut">
               <a:rPr lang="en-GB" smtClean="0"/>
-              <a:t>23/03/2018</a:t>
+              <a:t>09/07/2018</a:t>
             </a:fld>
             <a:endParaRPr lang="en-GB"/>
           </a:p>
@@ -1164,7 +1165,7 @@
           <a:p>
             <a:fld id="{103F0B6B-0F34-4B60-AA46-B717113E1AE3}" type="datetimeFigureOut">
               <a:rPr lang="en-GB" smtClean="0"/>
-              <a:t>23/03/2018</a:t>
+              <a:t>09/07/2018</a:t>
             </a:fld>
             <a:endParaRPr lang="en-GB"/>
           </a:p>
@@ -1410,7 +1411,7 @@
           <a:p>
             <a:fld id="{103F0B6B-0F34-4B60-AA46-B717113E1AE3}" type="datetimeFigureOut">
               <a:rPr lang="en-GB" smtClean="0"/>
-              <a:t>23/03/2018</a:t>
+              <a:t>09/07/2018</a:t>
             </a:fld>
             <a:endParaRPr lang="en-GB"/>
           </a:p>
@@ -1698,7 +1699,7 @@
           <a:p>
             <a:fld id="{103F0B6B-0F34-4B60-AA46-B717113E1AE3}" type="datetimeFigureOut">
               <a:rPr lang="en-GB" smtClean="0"/>
-              <a:t>23/03/2018</a:t>
+              <a:t>09/07/2018</a:t>
             </a:fld>
             <a:endParaRPr lang="en-GB"/>
           </a:p>
@@ -2120,7 +2121,7 @@
           <a:p>
             <a:fld id="{103F0B6B-0F34-4B60-AA46-B717113E1AE3}" type="datetimeFigureOut">
               <a:rPr lang="en-GB" smtClean="0"/>
-              <a:t>23/03/2018</a:t>
+              <a:t>09/07/2018</a:t>
             </a:fld>
             <a:endParaRPr lang="en-GB"/>
           </a:p>
@@ -2238,7 +2239,7 @@
           <a:p>
             <a:fld id="{103F0B6B-0F34-4B60-AA46-B717113E1AE3}" type="datetimeFigureOut">
               <a:rPr lang="en-GB" smtClean="0"/>
-              <a:t>23/03/2018</a:t>
+              <a:t>09/07/2018</a:t>
             </a:fld>
             <a:endParaRPr lang="en-GB"/>
           </a:p>
@@ -2333,7 +2334,7 @@
           <a:p>
             <a:fld id="{103F0B6B-0F34-4B60-AA46-B717113E1AE3}" type="datetimeFigureOut">
               <a:rPr lang="en-GB" smtClean="0"/>
-              <a:t>23/03/2018</a:t>
+              <a:t>09/07/2018</a:t>
             </a:fld>
             <a:endParaRPr lang="en-GB"/>
           </a:p>
@@ -2610,7 +2611,7 @@
           <a:p>
             <a:fld id="{103F0B6B-0F34-4B60-AA46-B717113E1AE3}" type="datetimeFigureOut">
               <a:rPr lang="en-GB" smtClean="0"/>
-              <a:t>23/03/2018</a:t>
+              <a:t>09/07/2018</a:t>
             </a:fld>
             <a:endParaRPr lang="en-GB"/>
           </a:p>
@@ -2863,7 +2864,7 @@
           <a:p>
             <a:fld id="{103F0B6B-0F34-4B60-AA46-B717113E1AE3}" type="datetimeFigureOut">
               <a:rPr lang="en-GB" smtClean="0"/>
-              <a:t>23/03/2018</a:t>
+              <a:t>09/07/2018</a:t>
             </a:fld>
             <a:endParaRPr lang="en-GB"/>
           </a:p>
@@ -3076,7 +3077,7 @@
           <a:p>
             <a:fld id="{103F0B6B-0F34-4B60-AA46-B717113E1AE3}" type="datetimeFigureOut">
               <a:rPr lang="en-GB" smtClean="0"/>
-              <a:t>23/03/2018</a:t>
+              <a:t>09/07/2018</a:t>
             </a:fld>
             <a:endParaRPr lang="en-GB"/>
           </a:p>
@@ -12273,6 +12274,262 @@
     <p:extLst>
       <p:ext uri="{BB962C8B-B14F-4D97-AF65-F5344CB8AC3E}">
         <p14:creationId xmlns:p14="http://schemas.microsoft.com/office/powerpoint/2010/main" val="1522714092"/>
+      </p:ext>
+    </p:extLst>
+  </p:cSld>
+  <p:clrMapOvr>
+    <a:masterClrMapping/>
+  </p:clrMapOvr>
+</p:sld>
+</file>
+
+<file path=ppt/slides/slide5.xml><?xml version="1.0" encoding="utf-8"?>
+<p:sld xmlns:a="http://schemas.openxmlformats.org/drawingml/2006/main" xmlns:r="http://schemas.openxmlformats.org/officeDocument/2006/relationships" xmlns:p="http://schemas.openxmlformats.org/presentationml/2006/main">
+  <p:cSld>
+    <p:spTree>
+      <p:nvGrpSpPr>
+        <p:cNvPr id="1" name=""/>
+        <p:cNvGrpSpPr/>
+        <p:nvPr/>
+      </p:nvGrpSpPr>
+      <p:grpSpPr>
+        <a:xfrm>
+          <a:off x="0" y="0"/>
+          <a:ext cx="0" cy="0"/>
+          <a:chOff x="0" y="0"/>
+          <a:chExt cx="0" cy="0"/>
+        </a:xfrm>
+      </p:grpSpPr>
+      <p:sp>
+        <p:nvSpPr>
+          <p:cNvPr id="2" name="Title 1"/>
+          <p:cNvSpPr>
+            <a:spLocks noGrp="1"/>
+          </p:cNvSpPr>
+          <p:nvPr>
+            <p:ph type="title"/>
+          </p:nvPr>
+        </p:nvSpPr>
+        <p:spPr>
+          <a:xfrm>
+            <a:off x="342900" y="366184"/>
+            <a:ext cx="6172200" cy="461400"/>
+          </a:xfrm>
+        </p:spPr>
+        <p:txBody>
+          <a:bodyPr>
+            <a:normAutofit fontScale="90000"/>
+          </a:bodyPr>
+          <a:lstStyle/>
+          <a:p>
+            <a:r>
+              <a:rPr lang="en-GB" dirty="0" err="1" smtClean="0"/>
+              <a:t>Ei</a:t>
+            </a:r>
+            <a:r>
+              <a:rPr lang="en-GB" dirty="0" smtClean="0"/>
+              <a:t>=800 overview</a:t>
+            </a:r>
+            <a:endParaRPr lang="en-GB" dirty="0"/>
+          </a:p>
+        </p:txBody>
+      </p:sp>
+      <p:pic>
+        <p:nvPicPr>
+          <p:cNvPr id="1026" name="Picture 2"/>
+          <p:cNvPicPr>
+            <a:picLocks noChangeAspect="1" noChangeArrowheads="1"/>
+          </p:cNvPicPr>
+          <p:nvPr/>
+        </p:nvPicPr>
+        <p:blipFill>
+          <a:blip r:embed="rId2">
+            <a:extLst>
+              <a:ext uri="{28A0092B-C50C-407E-A947-70E740481C1C}">
+                <a14:useLocalDpi xmlns:a14="http://schemas.microsoft.com/office/drawing/2010/main" val="0"/>
+              </a:ext>
+            </a:extLst>
+          </a:blip>
+          <a:srcRect/>
+          <a:stretch>
+            <a:fillRect/>
+          </a:stretch>
+        </p:blipFill>
+        <p:spPr bwMode="auto">
+          <a:xfrm>
+            <a:off x="1556792" y="3491880"/>
+            <a:ext cx="3362004" cy="2520000"/>
+          </a:xfrm>
+          <a:prstGeom prst="rect">
+            <a:avLst/>
+          </a:prstGeom>
+          <a:noFill/>
+          <a:ln>
+            <a:noFill/>
+          </a:ln>
+          <a:effectLst/>
+          <a:extLst>
+            <a:ext uri="{909E8E84-426E-40DD-AFC4-6F175D3DCCD1}">
+              <a14:hiddenFill xmlns:a14="http://schemas.microsoft.com/office/drawing/2010/main">
+                <a:solidFill>
+                  <a:schemeClr val="accent1"/>
+                </a:solidFill>
+              </a14:hiddenFill>
+            </a:ext>
+            <a:ext uri="{91240B29-F687-4F45-9708-019B960494DF}">
+              <a14:hiddenLine xmlns:a14="http://schemas.microsoft.com/office/drawing/2010/main" w="9525">
+                <a:solidFill>
+                  <a:schemeClr val="tx1"/>
+                </a:solidFill>
+                <a:miter lim="800000"/>
+                <a:headEnd/>
+                <a:tailEnd/>
+              </a14:hiddenLine>
+            </a:ext>
+            <a:ext uri="{AF507438-7753-43E0-B8FC-AC1667EBCBE1}">
+              <a14:hiddenEffects xmlns:a14="http://schemas.microsoft.com/office/drawing/2010/main">
+                <a:effectLst>
+                  <a:outerShdw dist="35921" dir="2700000" algn="ctr" rotWithShape="0">
+                    <a:schemeClr val="bg2"/>
+                  </a:outerShdw>
+                </a:effectLst>
+              </a14:hiddenEffects>
+            </a:ext>
+          </a:extLst>
+        </p:spPr>
+      </p:pic>
+      <p:pic>
+        <p:nvPicPr>
+          <p:cNvPr id="1027" name="Picture 3"/>
+          <p:cNvPicPr>
+            <a:picLocks noChangeAspect="1" noChangeArrowheads="1"/>
+          </p:cNvPicPr>
+          <p:nvPr/>
+        </p:nvPicPr>
+        <p:blipFill>
+          <a:blip r:embed="rId3">
+            <a:extLst>
+              <a:ext uri="{28A0092B-C50C-407E-A947-70E740481C1C}">
+                <a14:useLocalDpi xmlns:a14="http://schemas.microsoft.com/office/drawing/2010/main" val="0"/>
+              </a:ext>
+            </a:extLst>
+          </a:blip>
+          <a:srcRect/>
+          <a:stretch>
+            <a:fillRect/>
+          </a:stretch>
+        </p:blipFill>
+        <p:spPr bwMode="auto">
+          <a:xfrm>
+            <a:off x="1470371" y="899592"/>
+            <a:ext cx="3362005" cy="2520000"/>
+          </a:xfrm>
+          <a:prstGeom prst="rect">
+            <a:avLst/>
+          </a:prstGeom>
+          <a:noFill/>
+          <a:ln>
+            <a:noFill/>
+          </a:ln>
+          <a:effectLst/>
+          <a:extLst>
+            <a:ext uri="{909E8E84-426E-40DD-AFC4-6F175D3DCCD1}">
+              <a14:hiddenFill xmlns:a14="http://schemas.microsoft.com/office/drawing/2010/main">
+                <a:solidFill>
+                  <a:schemeClr val="accent1"/>
+                </a:solidFill>
+              </a14:hiddenFill>
+            </a:ext>
+            <a:ext uri="{91240B29-F687-4F45-9708-019B960494DF}">
+              <a14:hiddenLine xmlns:a14="http://schemas.microsoft.com/office/drawing/2010/main" w="9525">
+                <a:solidFill>
+                  <a:schemeClr val="tx1"/>
+                </a:solidFill>
+                <a:miter lim="800000"/>
+                <a:headEnd/>
+                <a:tailEnd/>
+              </a14:hiddenLine>
+            </a:ext>
+            <a:ext uri="{AF507438-7753-43E0-B8FC-AC1667EBCBE1}">
+              <a14:hiddenEffects xmlns:a14="http://schemas.microsoft.com/office/drawing/2010/main">
+                <a:effectLst>
+                  <a:outerShdw dist="35921" dir="2700000" algn="ctr" rotWithShape="0">
+                    <a:schemeClr val="bg2"/>
+                  </a:outerShdw>
+                </a:effectLst>
+              </a14:hiddenEffects>
+            </a:ext>
+          </a:extLst>
+        </p:spPr>
+      </p:pic>
+      <p:pic>
+        <p:nvPicPr>
+          <p:cNvPr id="1028" name="Picture 4"/>
+          <p:cNvPicPr>
+            <a:picLocks noChangeAspect="1" noChangeArrowheads="1"/>
+          </p:cNvPicPr>
+          <p:nvPr/>
+        </p:nvPicPr>
+        <p:blipFill>
+          <a:blip r:embed="rId4">
+            <a:extLst>
+              <a:ext uri="{28A0092B-C50C-407E-A947-70E740481C1C}">
+                <a14:useLocalDpi xmlns:a14="http://schemas.microsoft.com/office/drawing/2010/main" val="0"/>
+              </a:ext>
+            </a:extLst>
+          </a:blip>
+          <a:srcRect/>
+          <a:stretch>
+            <a:fillRect/>
+          </a:stretch>
+        </p:blipFill>
+        <p:spPr bwMode="auto">
+          <a:xfrm>
+            <a:off x="1650391" y="6149560"/>
+            <a:ext cx="3001964" cy="2520000"/>
+          </a:xfrm>
+          <a:prstGeom prst="rect">
+            <a:avLst/>
+          </a:prstGeom>
+          <a:noFill/>
+          <a:ln>
+            <a:noFill/>
+          </a:ln>
+          <a:effectLst/>
+          <a:extLst>
+            <a:ext uri="{909E8E84-426E-40DD-AFC4-6F175D3DCCD1}">
+              <a14:hiddenFill xmlns:a14="http://schemas.microsoft.com/office/drawing/2010/main">
+                <a:solidFill>
+                  <a:schemeClr val="accent1"/>
+                </a:solidFill>
+              </a14:hiddenFill>
+            </a:ext>
+            <a:ext uri="{91240B29-F687-4F45-9708-019B960494DF}">
+              <a14:hiddenLine xmlns:a14="http://schemas.microsoft.com/office/drawing/2010/main" w="9525">
+                <a:solidFill>
+                  <a:schemeClr val="tx1"/>
+                </a:solidFill>
+                <a:miter lim="800000"/>
+                <a:headEnd/>
+                <a:tailEnd/>
+              </a14:hiddenLine>
+            </a:ext>
+            <a:ext uri="{AF507438-7753-43E0-B8FC-AC1667EBCBE1}">
+              <a14:hiddenEffects xmlns:a14="http://schemas.microsoft.com/office/drawing/2010/main">
+                <a:effectLst>
+                  <a:outerShdw dist="35921" dir="2700000" algn="ctr" rotWithShape="0">
+                    <a:schemeClr val="bg2"/>
+                  </a:outerShdw>
+                </a:effectLst>
+              </a14:hiddenEffects>
+            </a:ext>
+          </a:extLst>
+        </p:spPr>
+      </p:pic>
+    </p:spTree>
+    <p:extLst>
+      <p:ext uri="{BB962C8B-B14F-4D97-AF65-F5344CB8AC3E}">
+        <p14:creationId xmlns:p14="http://schemas.microsoft.com/office/powerpoint/2010/main" val="1460331061"/>
       </p:ext>
     </p:extLst>
   </p:cSld>

</xml_diff>

<commit_message>
Some additional plotting utilises, in particular plot for EnCutBlock and plot verifying the gamma sensitivity.
</commit_message>
<xml_diff>
--- a/2018April/Working2018.pptx
+++ b/2018April/Working2018.pptx
@@ -5,7 +5,7 @@
     <p:sldMasterId id="2147483648" r:id="rId1"/>
   </p:sldMasterIdLst>
   <p:notesMasterIdLst>
-    <p:notesMasterId r:id="rId7"/>
+    <p:notesMasterId r:id="rId11"/>
   </p:notesMasterIdLst>
   <p:sldIdLst>
     <p:sldId id="256" r:id="rId2"/>
@@ -13,6 +13,10 @@
     <p:sldId id="309" r:id="rId4"/>
     <p:sldId id="310" r:id="rId5"/>
     <p:sldId id="311" r:id="rId6"/>
+    <p:sldId id="312" r:id="rId7"/>
+    <p:sldId id="314" r:id="rId8"/>
+    <p:sldId id="315" r:id="rId9"/>
+    <p:sldId id="316" r:id="rId10"/>
   </p:sldIdLst>
   <p:sldSz cx="6858000" cy="9144000" type="screen4x3"/>
   <p:notesSz cx="6858000" cy="9144000"/>
@@ -196,7 +200,7 @@
           <a:p>
             <a:fld id="{E87E9B2F-430F-4F06-B73A-3E686DF7F97D}" type="datetimeFigureOut">
               <a:rPr lang="en-GB" smtClean="0"/>
-              <a:t>09/07/2018</a:t>
+              <a:t>16/07/2018</a:t>
             </a:fld>
             <a:endParaRPr lang="en-GB"/>
           </a:p>
@@ -645,7 +649,7 @@
           <a:p>
             <a:fld id="{103F0B6B-0F34-4B60-AA46-B717113E1AE3}" type="datetimeFigureOut">
               <a:rPr lang="en-GB" smtClean="0"/>
-              <a:t>09/07/2018</a:t>
+              <a:t>16/07/2018</a:t>
             </a:fld>
             <a:endParaRPr lang="en-GB"/>
           </a:p>
@@ -815,7 +819,7 @@
           <a:p>
             <a:fld id="{103F0B6B-0F34-4B60-AA46-B717113E1AE3}" type="datetimeFigureOut">
               <a:rPr lang="en-GB" smtClean="0"/>
-              <a:t>09/07/2018</a:t>
+              <a:t>16/07/2018</a:t>
             </a:fld>
             <a:endParaRPr lang="en-GB"/>
           </a:p>
@@ -995,7 +999,7 @@
           <a:p>
             <a:fld id="{103F0B6B-0F34-4B60-AA46-B717113E1AE3}" type="datetimeFigureOut">
               <a:rPr lang="en-GB" smtClean="0"/>
-              <a:t>09/07/2018</a:t>
+              <a:t>16/07/2018</a:t>
             </a:fld>
             <a:endParaRPr lang="en-GB"/>
           </a:p>
@@ -1165,7 +1169,7 @@
           <a:p>
             <a:fld id="{103F0B6B-0F34-4B60-AA46-B717113E1AE3}" type="datetimeFigureOut">
               <a:rPr lang="en-GB" smtClean="0"/>
-              <a:t>09/07/2018</a:t>
+              <a:t>16/07/2018</a:t>
             </a:fld>
             <a:endParaRPr lang="en-GB"/>
           </a:p>
@@ -1411,7 +1415,7 @@
           <a:p>
             <a:fld id="{103F0B6B-0F34-4B60-AA46-B717113E1AE3}" type="datetimeFigureOut">
               <a:rPr lang="en-GB" smtClean="0"/>
-              <a:t>09/07/2018</a:t>
+              <a:t>16/07/2018</a:t>
             </a:fld>
             <a:endParaRPr lang="en-GB"/>
           </a:p>
@@ -1699,7 +1703,7 @@
           <a:p>
             <a:fld id="{103F0B6B-0F34-4B60-AA46-B717113E1AE3}" type="datetimeFigureOut">
               <a:rPr lang="en-GB" smtClean="0"/>
-              <a:t>09/07/2018</a:t>
+              <a:t>16/07/2018</a:t>
             </a:fld>
             <a:endParaRPr lang="en-GB"/>
           </a:p>
@@ -2121,7 +2125,7 @@
           <a:p>
             <a:fld id="{103F0B6B-0F34-4B60-AA46-B717113E1AE3}" type="datetimeFigureOut">
               <a:rPr lang="en-GB" smtClean="0"/>
-              <a:t>09/07/2018</a:t>
+              <a:t>16/07/2018</a:t>
             </a:fld>
             <a:endParaRPr lang="en-GB"/>
           </a:p>
@@ -2239,7 +2243,7 @@
           <a:p>
             <a:fld id="{103F0B6B-0F34-4B60-AA46-B717113E1AE3}" type="datetimeFigureOut">
               <a:rPr lang="en-GB" smtClean="0"/>
-              <a:t>09/07/2018</a:t>
+              <a:t>16/07/2018</a:t>
             </a:fld>
             <a:endParaRPr lang="en-GB"/>
           </a:p>
@@ -2334,7 +2338,7 @@
           <a:p>
             <a:fld id="{103F0B6B-0F34-4B60-AA46-B717113E1AE3}" type="datetimeFigureOut">
               <a:rPr lang="en-GB" smtClean="0"/>
-              <a:t>09/07/2018</a:t>
+              <a:t>16/07/2018</a:t>
             </a:fld>
             <a:endParaRPr lang="en-GB"/>
           </a:p>
@@ -2611,7 +2615,7 @@
           <a:p>
             <a:fld id="{103F0B6B-0F34-4B60-AA46-B717113E1AE3}" type="datetimeFigureOut">
               <a:rPr lang="en-GB" smtClean="0"/>
-              <a:t>09/07/2018</a:t>
+              <a:t>16/07/2018</a:t>
             </a:fld>
             <a:endParaRPr lang="en-GB"/>
           </a:p>
@@ -2864,7 +2868,7 @@
           <a:p>
             <a:fld id="{103F0B6B-0F34-4B60-AA46-B717113E1AE3}" type="datetimeFigureOut">
               <a:rPr lang="en-GB" smtClean="0"/>
-              <a:t>09/07/2018</a:t>
+              <a:t>16/07/2018</a:t>
             </a:fld>
             <a:endParaRPr lang="en-GB"/>
           </a:p>
@@ -3077,7 +3081,7 @@
           <a:p>
             <a:fld id="{103F0B6B-0F34-4B60-AA46-B717113E1AE3}" type="datetimeFigureOut">
               <a:rPr lang="en-GB" smtClean="0"/>
-              <a:t>09/07/2018</a:t>
+              <a:t>16/07/2018</a:t>
             </a:fld>
             <a:endParaRPr lang="en-GB"/>
           </a:p>
@@ -12530,6 +12534,948 @@
     <p:extLst>
       <p:ext uri="{BB962C8B-B14F-4D97-AF65-F5344CB8AC3E}">
         <p14:creationId xmlns:p14="http://schemas.microsoft.com/office/powerpoint/2010/main" val="1460331061"/>
+      </p:ext>
+    </p:extLst>
+  </p:cSld>
+  <p:clrMapOvr>
+    <a:masterClrMapping/>
+  </p:clrMapOvr>
+</p:sld>
+</file>
+
+<file path=ppt/slides/slide6.xml><?xml version="1.0" encoding="utf-8"?>
+<p:sld xmlns:a="http://schemas.openxmlformats.org/drawingml/2006/main" xmlns:r="http://schemas.openxmlformats.org/officeDocument/2006/relationships" xmlns:p="http://schemas.openxmlformats.org/presentationml/2006/main">
+  <p:cSld>
+    <p:spTree>
+      <p:nvGrpSpPr>
+        <p:cNvPr id="1" name=""/>
+        <p:cNvGrpSpPr/>
+        <p:nvPr/>
+      </p:nvGrpSpPr>
+      <p:grpSpPr>
+        <a:xfrm>
+          <a:off x="0" y="0"/>
+          <a:ext cx="0" cy="0"/>
+          <a:chOff x="0" y="0"/>
+          <a:chExt cx="0" cy="0"/>
+        </a:xfrm>
+      </p:grpSpPr>
+      <p:pic>
+        <p:nvPicPr>
+          <p:cNvPr id="1026" name="Picture 2"/>
+          <p:cNvPicPr>
+            <a:picLocks noChangeAspect="1" noChangeArrowheads="1"/>
+          </p:cNvPicPr>
+          <p:nvPr/>
+        </p:nvPicPr>
+        <p:blipFill>
+          <a:blip r:embed="rId2">
+            <a:extLst>
+              <a:ext uri="{28A0092B-C50C-407E-A947-70E740481C1C}">
+                <a14:useLocalDpi xmlns:a14="http://schemas.microsoft.com/office/drawing/2010/main" val="0"/>
+              </a:ext>
+            </a:extLst>
+          </a:blip>
+          <a:srcRect/>
+          <a:stretch>
+            <a:fillRect/>
+          </a:stretch>
+        </p:blipFill>
+        <p:spPr bwMode="auto">
+          <a:xfrm>
+            <a:off x="754900" y="827584"/>
+            <a:ext cx="5324475" cy="3990975"/>
+          </a:xfrm>
+          <a:prstGeom prst="rect">
+            <a:avLst/>
+          </a:prstGeom>
+          <a:noFill/>
+          <a:ln>
+            <a:noFill/>
+          </a:ln>
+          <a:effectLst/>
+          <a:extLst>
+            <a:ext uri="{909E8E84-426E-40DD-AFC4-6F175D3DCCD1}">
+              <a14:hiddenFill xmlns:a14="http://schemas.microsoft.com/office/drawing/2010/main">
+                <a:solidFill>
+                  <a:schemeClr val="accent1"/>
+                </a:solidFill>
+              </a14:hiddenFill>
+            </a:ext>
+            <a:ext uri="{91240B29-F687-4F45-9708-019B960494DF}">
+              <a14:hiddenLine xmlns:a14="http://schemas.microsoft.com/office/drawing/2010/main" w="9525">
+                <a:solidFill>
+                  <a:schemeClr val="tx1"/>
+                </a:solidFill>
+                <a:miter lim="800000"/>
+                <a:headEnd/>
+                <a:tailEnd/>
+              </a14:hiddenLine>
+            </a:ext>
+            <a:ext uri="{AF507438-7753-43E0-B8FC-AC1667EBCBE1}">
+              <a14:hiddenEffects xmlns:a14="http://schemas.microsoft.com/office/drawing/2010/main">
+                <a:effectLst>
+                  <a:outerShdw dist="35921" dir="2700000" algn="ctr" rotWithShape="0">
+                    <a:schemeClr val="bg2"/>
+                  </a:outerShdw>
+                </a:effectLst>
+              </a14:hiddenEffects>
+            </a:ext>
+          </a:extLst>
+        </p:spPr>
+      </p:pic>
+      <p:sp>
+        <p:nvSpPr>
+          <p:cNvPr id="4" name="TextBox 3"/>
+          <p:cNvSpPr txBox="1"/>
+          <p:nvPr/>
+        </p:nvSpPr>
+        <p:spPr>
+          <a:xfrm>
+            <a:off x="1484784" y="683568"/>
+            <a:ext cx="768159" cy="369332"/>
+          </a:xfrm>
+          <a:prstGeom prst="rect">
+            <a:avLst/>
+          </a:prstGeom>
+          <a:noFill/>
+        </p:spPr>
+        <p:txBody>
+          <a:bodyPr wrap="none" rtlCol="0">
+            <a:spAutoFit/>
+          </a:bodyPr>
+          <a:lstStyle/>
+          <a:p>
+            <a:r>
+              <a:rPr lang="en-GB" dirty="0" err="1" smtClean="0"/>
+              <a:t>dE</a:t>
+            </a:r>
+            <a:r>
+              <a:rPr lang="en-GB" dirty="0" smtClean="0"/>
+              <a:t>=50</a:t>
+            </a:r>
+            <a:endParaRPr lang="en-GB" dirty="0"/>
+          </a:p>
+        </p:txBody>
+      </p:sp>
+      <p:sp>
+        <p:nvSpPr>
+          <p:cNvPr id="5" name="TextBox 4"/>
+          <p:cNvSpPr txBox="1"/>
+          <p:nvPr/>
+        </p:nvSpPr>
+        <p:spPr>
+          <a:xfrm>
+            <a:off x="1412776" y="323528"/>
+            <a:ext cx="2907142" cy="369332"/>
+          </a:xfrm>
+          <a:prstGeom prst="rect">
+            <a:avLst/>
+          </a:prstGeom>
+          <a:noFill/>
+        </p:spPr>
+        <p:txBody>
+          <a:bodyPr wrap="none" rtlCol="0">
+            <a:spAutoFit/>
+          </a:bodyPr>
+          <a:lstStyle/>
+          <a:p>
+            <a:r>
+              <a:rPr lang="en-GB" dirty="0" smtClean="0"/>
+              <a:t>Incident Energy -&gt;</a:t>
+            </a:r>
+            <a:r>
+              <a:rPr lang="en-GB" dirty="0" err="1" smtClean="0"/>
+              <a:t>Ei</a:t>
+            </a:r>
+            <a:r>
+              <a:rPr lang="en-GB" dirty="0" smtClean="0"/>
+              <a:t>=401mEv</a:t>
+            </a:r>
+            <a:endParaRPr lang="en-GB" dirty="0"/>
+          </a:p>
+        </p:txBody>
+      </p:sp>
+      <p:pic>
+        <p:nvPicPr>
+          <p:cNvPr id="1027" name="Picture 3"/>
+          <p:cNvPicPr>
+            <a:picLocks noChangeAspect="1" noChangeArrowheads="1"/>
+          </p:cNvPicPr>
+          <p:nvPr/>
+        </p:nvPicPr>
+        <p:blipFill>
+          <a:blip r:embed="rId3">
+            <a:extLst>
+              <a:ext uri="{28A0092B-C50C-407E-A947-70E740481C1C}">
+                <a14:useLocalDpi xmlns:a14="http://schemas.microsoft.com/office/drawing/2010/main" val="0"/>
+              </a:ext>
+            </a:extLst>
+          </a:blip>
+          <a:srcRect/>
+          <a:stretch>
+            <a:fillRect/>
+          </a:stretch>
+        </p:blipFill>
+        <p:spPr bwMode="auto">
+          <a:xfrm>
+            <a:off x="791116" y="4922748"/>
+            <a:ext cx="5324475" cy="3990975"/>
+          </a:xfrm>
+          <a:prstGeom prst="rect">
+            <a:avLst/>
+          </a:prstGeom>
+          <a:noFill/>
+          <a:ln>
+            <a:noFill/>
+          </a:ln>
+          <a:effectLst/>
+          <a:extLst>
+            <a:ext uri="{909E8E84-426E-40DD-AFC4-6F175D3DCCD1}">
+              <a14:hiddenFill xmlns:a14="http://schemas.microsoft.com/office/drawing/2010/main">
+                <a:solidFill>
+                  <a:schemeClr val="accent1"/>
+                </a:solidFill>
+              </a14:hiddenFill>
+            </a:ext>
+            <a:ext uri="{91240B29-F687-4F45-9708-019B960494DF}">
+              <a14:hiddenLine xmlns:a14="http://schemas.microsoft.com/office/drawing/2010/main" w="9525">
+                <a:solidFill>
+                  <a:schemeClr val="tx1"/>
+                </a:solidFill>
+                <a:miter lim="800000"/>
+                <a:headEnd/>
+                <a:tailEnd/>
+              </a14:hiddenLine>
+            </a:ext>
+            <a:ext uri="{AF507438-7753-43E0-B8FC-AC1667EBCBE1}">
+              <a14:hiddenEffects xmlns:a14="http://schemas.microsoft.com/office/drawing/2010/main">
+                <a:effectLst>
+                  <a:outerShdw dist="35921" dir="2700000" algn="ctr" rotWithShape="0">
+                    <a:schemeClr val="bg2"/>
+                  </a:outerShdw>
+                </a:effectLst>
+              </a14:hiddenEffects>
+            </a:ext>
+          </a:extLst>
+        </p:spPr>
+      </p:pic>
+      <p:sp>
+        <p:nvSpPr>
+          <p:cNvPr id="6" name="TextBox 5"/>
+          <p:cNvSpPr txBox="1"/>
+          <p:nvPr/>
+        </p:nvSpPr>
+        <p:spPr>
+          <a:xfrm>
+            <a:off x="1373560" y="4818559"/>
+            <a:ext cx="768159" cy="369332"/>
+          </a:xfrm>
+          <a:prstGeom prst="rect">
+            <a:avLst/>
+          </a:prstGeom>
+          <a:noFill/>
+        </p:spPr>
+        <p:txBody>
+          <a:bodyPr wrap="none" rtlCol="0">
+            <a:spAutoFit/>
+          </a:bodyPr>
+          <a:lstStyle/>
+          <a:p>
+            <a:r>
+              <a:rPr lang="en-GB" dirty="0" err="1" smtClean="0"/>
+              <a:t>dE</a:t>
+            </a:r>
+            <a:r>
+              <a:rPr lang="en-GB" dirty="0" smtClean="0"/>
+              <a:t>=70</a:t>
+            </a:r>
+            <a:endParaRPr lang="en-GB" dirty="0"/>
+          </a:p>
+        </p:txBody>
+      </p:sp>
+    </p:spTree>
+    <p:extLst>
+      <p:ext uri="{BB962C8B-B14F-4D97-AF65-F5344CB8AC3E}">
+        <p14:creationId xmlns:p14="http://schemas.microsoft.com/office/powerpoint/2010/main" val="1558425293"/>
+      </p:ext>
+    </p:extLst>
+  </p:cSld>
+  <p:clrMapOvr>
+    <a:masterClrMapping/>
+  </p:clrMapOvr>
+</p:sld>
+</file>
+
+<file path=ppt/slides/slide7.xml><?xml version="1.0" encoding="utf-8"?>
+<p:sld xmlns:a="http://schemas.openxmlformats.org/drawingml/2006/main" xmlns:r="http://schemas.openxmlformats.org/officeDocument/2006/relationships" xmlns:p="http://schemas.openxmlformats.org/presentationml/2006/main">
+  <p:cSld>
+    <p:spTree>
+      <p:nvGrpSpPr>
+        <p:cNvPr id="1" name=""/>
+        <p:cNvGrpSpPr/>
+        <p:nvPr/>
+      </p:nvGrpSpPr>
+      <p:grpSpPr>
+        <a:xfrm>
+          <a:off x="0" y="0"/>
+          <a:ext cx="0" cy="0"/>
+          <a:chOff x="0" y="0"/>
+          <a:chExt cx="0" cy="0"/>
+        </a:xfrm>
+      </p:grpSpPr>
+      <p:pic>
+        <p:nvPicPr>
+          <p:cNvPr id="2050" name="Picture 2"/>
+          <p:cNvPicPr>
+            <a:picLocks noChangeAspect="1" noChangeArrowheads="1"/>
+          </p:cNvPicPr>
+          <p:nvPr/>
+        </p:nvPicPr>
+        <p:blipFill>
+          <a:blip r:embed="rId2">
+            <a:extLst>
+              <a:ext uri="{28A0092B-C50C-407E-A947-70E740481C1C}">
+                <a14:useLocalDpi xmlns:a14="http://schemas.microsoft.com/office/drawing/2010/main" val="0"/>
+              </a:ext>
+            </a:extLst>
+          </a:blip>
+          <a:srcRect/>
+          <a:stretch>
+            <a:fillRect/>
+          </a:stretch>
+        </p:blipFill>
+        <p:spPr bwMode="auto">
+          <a:xfrm>
+            <a:off x="908720" y="595236"/>
+            <a:ext cx="5324475" cy="3990975"/>
+          </a:xfrm>
+          <a:prstGeom prst="rect">
+            <a:avLst/>
+          </a:prstGeom>
+          <a:noFill/>
+          <a:ln>
+            <a:noFill/>
+          </a:ln>
+          <a:effectLst/>
+          <a:extLst>
+            <a:ext uri="{909E8E84-426E-40DD-AFC4-6F175D3DCCD1}">
+              <a14:hiddenFill xmlns:a14="http://schemas.microsoft.com/office/drawing/2010/main">
+                <a:solidFill>
+                  <a:schemeClr val="accent1"/>
+                </a:solidFill>
+              </a14:hiddenFill>
+            </a:ext>
+            <a:ext uri="{91240B29-F687-4F45-9708-019B960494DF}">
+              <a14:hiddenLine xmlns:a14="http://schemas.microsoft.com/office/drawing/2010/main" w="9525">
+                <a:solidFill>
+                  <a:schemeClr val="tx1"/>
+                </a:solidFill>
+                <a:miter lim="800000"/>
+                <a:headEnd/>
+                <a:tailEnd/>
+              </a14:hiddenLine>
+            </a:ext>
+            <a:ext uri="{AF507438-7753-43E0-B8FC-AC1667EBCBE1}">
+              <a14:hiddenEffects xmlns:a14="http://schemas.microsoft.com/office/drawing/2010/main">
+                <a:effectLst>
+                  <a:outerShdw dist="35921" dir="2700000" algn="ctr" rotWithShape="0">
+                    <a:schemeClr val="bg2"/>
+                  </a:outerShdw>
+                </a:effectLst>
+              </a14:hiddenEffects>
+            </a:ext>
+          </a:extLst>
+        </p:spPr>
+      </p:pic>
+      <p:pic>
+        <p:nvPicPr>
+          <p:cNvPr id="2051" name="Picture 3"/>
+          <p:cNvPicPr>
+            <a:picLocks noChangeAspect="1" noChangeArrowheads="1"/>
+          </p:cNvPicPr>
+          <p:nvPr/>
+        </p:nvPicPr>
+        <p:blipFill>
+          <a:blip r:embed="rId3">
+            <a:extLst>
+              <a:ext uri="{28A0092B-C50C-407E-A947-70E740481C1C}">
+                <a14:useLocalDpi xmlns:a14="http://schemas.microsoft.com/office/drawing/2010/main" val="0"/>
+              </a:ext>
+            </a:extLst>
+          </a:blip>
+          <a:srcRect/>
+          <a:stretch>
+            <a:fillRect/>
+          </a:stretch>
+        </p:blipFill>
+        <p:spPr bwMode="auto">
+          <a:xfrm>
+            <a:off x="766763" y="4586211"/>
+            <a:ext cx="5324475" cy="3990975"/>
+          </a:xfrm>
+          <a:prstGeom prst="rect">
+            <a:avLst/>
+          </a:prstGeom>
+          <a:noFill/>
+          <a:ln>
+            <a:noFill/>
+          </a:ln>
+          <a:effectLst/>
+          <a:extLst>
+            <a:ext uri="{909E8E84-426E-40DD-AFC4-6F175D3DCCD1}">
+              <a14:hiddenFill xmlns:a14="http://schemas.microsoft.com/office/drawing/2010/main">
+                <a:solidFill>
+                  <a:schemeClr val="accent1"/>
+                </a:solidFill>
+              </a14:hiddenFill>
+            </a:ext>
+            <a:ext uri="{91240B29-F687-4F45-9708-019B960494DF}">
+              <a14:hiddenLine xmlns:a14="http://schemas.microsoft.com/office/drawing/2010/main" w="9525">
+                <a:solidFill>
+                  <a:schemeClr val="tx1"/>
+                </a:solidFill>
+                <a:miter lim="800000"/>
+                <a:headEnd/>
+                <a:tailEnd/>
+              </a14:hiddenLine>
+            </a:ext>
+            <a:ext uri="{AF507438-7753-43E0-B8FC-AC1667EBCBE1}">
+              <a14:hiddenEffects xmlns:a14="http://schemas.microsoft.com/office/drawing/2010/main">
+                <a:effectLst>
+                  <a:outerShdw dist="35921" dir="2700000" algn="ctr" rotWithShape="0">
+                    <a:schemeClr val="bg2"/>
+                  </a:outerShdw>
+                </a:effectLst>
+              </a14:hiddenEffects>
+            </a:ext>
+          </a:extLst>
+        </p:spPr>
+      </p:pic>
+      <p:sp>
+        <p:nvSpPr>
+          <p:cNvPr id="6" name="TextBox 5"/>
+          <p:cNvSpPr txBox="1"/>
+          <p:nvPr/>
+        </p:nvSpPr>
+        <p:spPr>
+          <a:xfrm>
+            <a:off x="1340768" y="314236"/>
+            <a:ext cx="768159" cy="369332"/>
+          </a:xfrm>
+          <a:prstGeom prst="rect">
+            <a:avLst/>
+          </a:prstGeom>
+          <a:noFill/>
+        </p:spPr>
+        <p:txBody>
+          <a:bodyPr wrap="none" rtlCol="0">
+            <a:spAutoFit/>
+          </a:bodyPr>
+          <a:lstStyle/>
+          <a:p>
+            <a:r>
+              <a:rPr lang="en-GB" dirty="0" err="1" smtClean="0"/>
+              <a:t>dE</a:t>
+            </a:r>
+            <a:r>
+              <a:rPr lang="en-GB" dirty="0" smtClean="0"/>
+              <a:t>=90</a:t>
+            </a:r>
+            <a:endParaRPr lang="en-GB" dirty="0"/>
+          </a:p>
+        </p:txBody>
+      </p:sp>
+      <p:sp>
+        <p:nvSpPr>
+          <p:cNvPr id="7" name="TextBox 6"/>
+          <p:cNvSpPr txBox="1"/>
+          <p:nvPr/>
+        </p:nvSpPr>
+        <p:spPr>
+          <a:xfrm>
+            <a:off x="1268760" y="4490700"/>
+            <a:ext cx="885179" cy="369332"/>
+          </a:xfrm>
+          <a:prstGeom prst="rect">
+            <a:avLst/>
+          </a:prstGeom>
+          <a:noFill/>
+        </p:spPr>
+        <p:txBody>
+          <a:bodyPr wrap="none" rtlCol="0">
+            <a:spAutoFit/>
+          </a:bodyPr>
+          <a:lstStyle/>
+          <a:p>
+            <a:r>
+              <a:rPr lang="en-GB" dirty="0" err="1" smtClean="0"/>
+              <a:t>dE</a:t>
+            </a:r>
+            <a:r>
+              <a:rPr lang="en-GB" dirty="0" smtClean="0"/>
+              <a:t>=110</a:t>
+            </a:r>
+            <a:endParaRPr lang="en-GB" dirty="0"/>
+          </a:p>
+        </p:txBody>
+      </p:sp>
+    </p:spTree>
+    <p:extLst>
+      <p:ext uri="{BB962C8B-B14F-4D97-AF65-F5344CB8AC3E}">
+        <p14:creationId xmlns:p14="http://schemas.microsoft.com/office/powerpoint/2010/main" val="1366155115"/>
+      </p:ext>
+    </p:extLst>
+  </p:cSld>
+  <p:clrMapOvr>
+    <a:masterClrMapping/>
+  </p:clrMapOvr>
+</p:sld>
+</file>
+
+<file path=ppt/slides/slide8.xml><?xml version="1.0" encoding="utf-8"?>
+<p:sld xmlns:a="http://schemas.openxmlformats.org/drawingml/2006/main" xmlns:r="http://schemas.openxmlformats.org/officeDocument/2006/relationships" xmlns:p="http://schemas.openxmlformats.org/presentationml/2006/main">
+  <p:cSld>
+    <p:spTree>
+      <p:nvGrpSpPr>
+        <p:cNvPr id="1" name=""/>
+        <p:cNvGrpSpPr/>
+        <p:nvPr/>
+      </p:nvGrpSpPr>
+      <p:grpSpPr>
+        <a:xfrm>
+          <a:off x="0" y="0"/>
+          <a:ext cx="0" cy="0"/>
+          <a:chOff x="0" y="0"/>
+          <a:chExt cx="0" cy="0"/>
+        </a:xfrm>
+      </p:grpSpPr>
+      <p:sp>
+        <p:nvSpPr>
+          <p:cNvPr id="6" name="TextBox 5"/>
+          <p:cNvSpPr txBox="1"/>
+          <p:nvPr/>
+        </p:nvSpPr>
+        <p:spPr>
+          <a:xfrm>
+            <a:off x="1340768" y="314236"/>
+            <a:ext cx="885179" cy="369332"/>
+          </a:xfrm>
+          <a:prstGeom prst="rect">
+            <a:avLst/>
+          </a:prstGeom>
+          <a:noFill/>
+        </p:spPr>
+        <p:txBody>
+          <a:bodyPr wrap="none" rtlCol="0">
+            <a:spAutoFit/>
+          </a:bodyPr>
+          <a:lstStyle/>
+          <a:p>
+            <a:r>
+              <a:rPr lang="en-GB" dirty="0" err="1" smtClean="0"/>
+              <a:t>dE</a:t>
+            </a:r>
+            <a:r>
+              <a:rPr lang="en-GB" dirty="0" smtClean="0"/>
+              <a:t>=130</a:t>
+            </a:r>
+            <a:endParaRPr lang="en-GB" dirty="0"/>
+          </a:p>
+        </p:txBody>
+      </p:sp>
+      <p:pic>
+        <p:nvPicPr>
+          <p:cNvPr id="3074" name="Picture 2"/>
+          <p:cNvPicPr>
+            <a:picLocks noChangeAspect="1" noChangeArrowheads="1"/>
+          </p:cNvPicPr>
+          <p:nvPr/>
+        </p:nvPicPr>
+        <p:blipFill>
+          <a:blip r:embed="rId2">
+            <a:extLst>
+              <a:ext uri="{28A0092B-C50C-407E-A947-70E740481C1C}">
+                <a14:useLocalDpi xmlns:a14="http://schemas.microsoft.com/office/drawing/2010/main" val="0"/>
+              </a:ext>
+            </a:extLst>
+          </a:blip>
+          <a:srcRect/>
+          <a:stretch>
+            <a:fillRect/>
+          </a:stretch>
+        </p:blipFill>
+        <p:spPr bwMode="auto">
+          <a:xfrm>
+            <a:off x="766763" y="684391"/>
+            <a:ext cx="5324475" cy="3990975"/>
+          </a:xfrm>
+          <a:prstGeom prst="rect">
+            <a:avLst/>
+          </a:prstGeom>
+          <a:noFill/>
+          <a:ln>
+            <a:noFill/>
+          </a:ln>
+          <a:effectLst/>
+          <a:extLst>
+            <a:ext uri="{909E8E84-426E-40DD-AFC4-6F175D3DCCD1}">
+              <a14:hiddenFill xmlns:a14="http://schemas.microsoft.com/office/drawing/2010/main">
+                <a:solidFill>
+                  <a:schemeClr val="accent1"/>
+                </a:solidFill>
+              </a14:hiddenFill>
+            </a:ext>
+            <a:ext uri="{91240B29-F687-4F45-9708-019B960494DF}">
+              <a14:hiddenLine xmlns:a14="http://schemas.microsoft.com/office/drawing/2010/main" w="9525">
+                <a:solidFill>
+                  <a:schemeClr val="tx1"/>
+                </a:solidFill>
+                <a:miter lim="800000"/>
+                <a:headEnd/>
+                <a:tailEnd/>
+              </a14:hiddenLine>
+            </a:ext>
+            <a:ext uri="{AF507438-7753-43E0-B8FC-AC1667EBCBE1}">
+              <a14:hiddenEffects xmlns:a14="http://schemas.microsoft.com/office/drawing/2010/main">
+                <a:effectLst>
+                  <a:outerShdw dist="35921" dir="2700000" algn="ctr" rotWithShape="0">
+                    <a:schemeClr val="bg2"/>
+                  </a:outerShdw>
+                </a:effectLst>
+              </a14:hiddenEffects>
+            </a:ext>
+          </a:extLst>
+        </p:spPr>
+      </p:pic>
+      <p:sp>
+        <p:nvSpPr>
+          <p:cNvPr id="7" name="TextBox 6"/>
+          <p:cNvSpPr txBox="1"/>
+          <p:nvPr/>
+        </p:nvSpPr>
+        <p:spPr>
+          <a:xfrm>
+            <a:off x="1268760" y="4490700"/>
+            <a:ext cx="885179" cy="369332"/>
+          </a:xfrm>
+          <a:prstGeom prst="rect">
+            <a:avLst/>
+          </a:prstGeom>
+          <a:noFill/>
+        </p:spPr>
+        <p:txBody>
+          <a:bodyPr wrap="none" rtlCol="0">
+            <a:spAutoFit/>
+          </a:bodyPr>
+          <a:lstStyle/>
+          <a:p>
+            <a:r>
+              <a:rPr lang="en-GB" dirty="0" err="1" smtClean="0"/>
+              <a:t>dE</a:t>
+            </a:r>
+            <a:r>
+              <a:rPr lang="en-GB" dirty="0" smtClean="0"/>
+              <a:t>=150</a:t>
+            </a:r>
+            <a:endParaRPr lang="en-GB" dirty="0"/>
+          </a:p>
+        </p:txBody>
+      </p:sp>
+      <p:pic>
+        <p:nvPicPr>
+          <p:cNvPr id="3075" name="Picture 3"/>
+          <p:cNvPicPr>
+            <a:picLocks noChangeAspect="1" noChangeArrowheads="1"/>
+          </p:cNvPicPr>
+          <p:nvPr/>
+        </p:nvPicPr>
+        <p:blipFill>
+          <a:blip r:embed="rId3">
+            <a:extLst>
+              <a:ext uri="{28A0092B-C50C-407E-A947-70E740481C1C}">
+                <a14:useLocalDpi xmlns:a14="http://schemas.microsoft.com/office/drawing/2010/main" val="0"/>
+              </a:ext>
+            </a:extLst>
+          </a:blip>
+          <a:srcRect/>
+          <a:stretch>
+            <a:fillRect/>
+          </a:stretch>
+        </p:blipFill>
+        <p:spPr bwMode="auto">
+          <a:xfrm>
+            <a:off x="620688" y="4837972"/>
+            <a:ext cx="5324475" cy="3990975"/>
+          </a:xfrm>
+          <a:prstGeom prst="rect">
+            <a:avLst/>
+          </a:prstGeom>
+          <a:noFill/>
+          <a:ln>
+            <a:noFill/>
+          </a:ln>
+          <a:effectLst/>
+          <a:extLst>
+            <a:ext uri="{909E8E84-426E-40DD-AFC4-6F175D3DCCD1}">
+              <a14:hiddenFill xmlns:a14="http://schemas.microsoft.com/office/drawing/2010/main">
+                <a:solidFill>
+                  <a:schemeClr val="accent1"/>
+                </a:solidFill>
+              </a14:hiddenFill>
+            </a:ext>
+            <a:ext uri="{91240B29-F687-4F45-9708-019B960494DF}">
+              <a14:hiddenLine xmlns:a14="http://schemas.microsoft.com/office/drawing/2010/main" w="9525">
+                <a:solidFill>
+                  <a:schemeClr val="tx1"/>
+                </a:solidFill>
+                <a:miter lim="800000"/>
+                <a:headEnd/>
+                <a:tailEnd/>
+              </a14:hiddenLine>
+            </a:ext>
+            <a:ext uri="{AF507438-7753-43E0-B8FC-AC1667EBCBE1}">
+              <a14:hiddenEffects xmlns:a14="http://schemas.microsoft.com/office/drawing/2010/main">
+                <a:effectLst>
+                  <a:outerShdw dist="35921" dir="2700000" algn="ctr" rotWithShape="0">
+                    <a:schemeClr val="bg2"/>
+                  </a:outerShdw>
+                </a:effectLst>
+              </a14:hiddenEffects>
+            </a:ext>
+          </a:extLst>
+        </p:spPr>
+      </p:pic>
+    </p:spTree>
+    <p:extLst>
+      <p:ext uri="{BB962C8B-B14F-4D97-AF65-F5344CB8AC3E}">
+        <p14:creationId xmlns:p14="http://schemas.microsoft.com/office/powerpoint/2010/main" val="3423966161"/>
+      </p:ext>
+    </p:extLst>
+  </p:cSld>
+  <p:clrMapOvr>
+    <a:masterClrMapping/>
+  </p:clrMapOvr>
+</p:sld>
+</file>
+
+<file path=ppt/slides/slide9.xml><?xml version="1.0" encoding="utf-8"?>
+<p:sld xmlns:a="http://schemas.openxmlformats.org/drawingml/2006/main" xmlns:r="http://schemas.openxmlformats.org/officeDocument/2006/relationships" xmlns:p="http://schemas.openxmlformats.org/presentationml/2006/main">
+  <p:cSld>
+    <p:spTree>
+      <p:nvGrpSpPr>
+        <p:cNvPr id="1" name=""/>
+        <p:cNvGrpSpPr/>
+        <p:nvPr/>
+      </p:nvGrpSpPr>
+      <p:grpSpPr>
+        <a:xfrm>
+          <a:off x="0" y="0"/>
+          <a:ext cx="0" cy="0"/>
+          <a:chOff x="0" y="0"/>
+          <a:chExt cx="0" cy="0"/>
+        </a:xfrm>
+      </p:grpSpPr>
+      <p:pic>
+        <p:nvPicPr>
+          <p:cNvPr id="4099" name="Picture 3"/>
+          <p:cNvPicPr>
+            <a:picLocks noChangeAspect="1" noChangeArrowheads="1"/>
+          </p:cNvPicPr>
+          <p:nvPr/>
+        </p:nvPicPr>
+        <p:blipFill>
+          <a:blip r:embed="rId2">
+            <a:extLst>
+              <a:ext uri="{28A0092B-C50C-407E-A947-70E740481C1C}">
+                <a14:useLocalDpi xmlns:a14="http://schemas.microsoft.com/office/drawing/2010/main" val="0"/>
+              </a:ext>
+            </a:extLst>
+          </a:blip>
+          <a:srcRect/>
+          <a:stretch>
+            <a:fillRect/>
+          </a:stretch>
+        </p:blipFill>
+        <p:spPr bwMode="auto">
+          <a:xfrm>
+            <a:off x="740177" y="602155"/>
+            <a:ext cx="5324475" cy="3990975"/>
+          </a:xfrm>
+          <a:prstGeom prst="rect">
+            <a:avLst/>
+          </a:prstGeom>
+          <a:noFill/>
+          <a:ln>
+            <a:noFill/>
+          </a:ln>
+          <a:effectLst/>
+          <a:extLst>
+            <a:ext uri="{909E8E84-426E-40DD-AFC4-6F175D3DCCD1}">
+              <a14:hiddenFill xmlns:a14="http://schemas.microsoft.com/office/drawing/2010/main">
+                <a:solidFill>
+                  <a:schemeClr val="accent1"/>
+                </a:solidFill>
+              </a14:hiddenFill>
+            </a:ext>
+            <a:ext uri="{91240B29-F687-4F45-9708-019B960494DF}">
+              <a14:hiddenLine xmlns:a14="http://schemas.microsoft.com/office/drawing/2010/main" w="9525">
+                <a:solidFill>
+                  <a:schemeClr val="tx1"/>
+                </a:solidFill>
+                <a:miter lim="800000"/>
+                <a:headEnd/>
+                <a:tailEnd/>
+              </a14:hiddenLine>
+            </a:ext>
+            <a:ext uri="{AF507438-7753-43E0-B8FC-AC1667EBCBE1}">
+              <a14:hiddenEffects xmlns:a14="http://schemas.microsoft.com/office/drawing/2010/main">
+                <a:effectLst>
+                  <a:outerShdw dist="35921" dir="2700000" algn="ctr" rotWithShape="0">
+                    <a:schemeClr val="bg2"/>
+                  </a:outerShdw>
+                </a:effectLst>
+              </a14:hiddenEffects>
+            </a:ext>
+          </a:extLst>
+        </p:spPr>
+      </p:pic>
+      <p:pic>
+        <p:nvPicPr>
+          <p:cNvPr id="4098" name="Picture 2"/>
+          <p:cNvPicPr>
+            <a:picLocks noChangeAspect="1" noChangeArrowheads="1"/>
+          </p:cNvPicPr>
+          <p:nvPr/>
+        </p:nvPicPr>
+        <p:blipFill>
+          <a:blip r:embed="rId3">
+            <a:extLst>
+              <a:ext uri="{28A0092B-C50C-407E-A947-70E740481C1C}">
+                <a14:useLocalDpi xmlns:a14="http://schemas.microsoft.com/office/drawing/2010/main" val="0"/>
+              </a:ext>
+            </a:extLst>
+          </a:blip>
+          <a:srcRect/>
+          <a:stretch>
+            <a:fillRect/>
+          </a:stretch>
+        </p:blipFill>
+        <p:spPr bwMode="auto">
+          <a:xfrm>
+            <a:off x="740178" y="4788024"/>
+            <a:ext cx="5324475" cy="3990975"/>
+          </a:xfrm>
+          <a:prstGeom prst="rect">
+            <a:avLst/>
+          </a:prstGeom>
+          <a:noFill/>
+          <a:ln>
+            <a:noFill/>
+          </a:ln>
+          <a:effectLst/>
+          <a:extLst>
+            <a:ext uri="{909E8E84-426E-40DD-AFC4-6F175D3DCCD1}">
+              <a14:hiddenFill xmlns:a14="http://schemas.microsoft.com/office/drawing/2010/main">
+                <a:solidFill>
+                  <a:schemeClr val="accent1"/>
+                </a:solidFill>
+              </a14:hiddenFill>
+            </a:ext>
+            <a:ext uri="{91240B29-F687-4F45-9708-019B960494DF}">
+              <a14:hiddenLine xmlns:a14="http://schemas.microsoft.com/office/drawing/2010/main" w="9525">
+                <a:solidFill>
+                  <a:schemeClr val="tx1"/>
+                </a:solidFill>
+                <a:miter lim="800000"/>
+                <a:headEnd/>
+                <a:tailEnd/>
+              </a14:hiddenLine>
+            </a:ext>
+            <a:ext uri="{AF507438-7753-43E0-B8FC-AC1667EBCBE1}">
+              <a14:hiddenEffects xmlns:a14="http://schemas.microsoft.com/office/drawing/2010/main">
+                <a:effectLst>
+                  <a:outerShdw dist="35921" dir="2700000" algn="ctr" rotWithShape="0">
+                    <a:schemeClr val="bg2"/>
+                  </a:outerShdw>
+                </a:effectLst>
+              </a14:hiddenEffects>
+            </a:ext>
+          </a:extLst>
+        </p:spPr>
+      </p:pic>
+      <p:sp>
+        <p:nvSpPr>
+          <p:cNvPr id="6" name="TextBox 5"/>
+          <p:cNvSpPr txBox="1"/>
+          <p:nvPr/>
+        </p:nvSpPr>
+        <p:spPr>
+          <a:xfrm>
+            <a:off x="1320876" y="4603358"/>
+            <a:ext cx="885179" cy="369332"/>
+          </a:xfrm>
+          <a:prstGeom prst="rect">
+            <a:avLst/>
+          </a:prstGeom>
+          <a:noFill/>
+        </p:spPr>
+        <p:txBody>
+          <a:bodyPr wrap="none" rtlCol="0">
+            <a:spAutoFit/>
+          </a:bodyPr>
+          <a:lstStyle/>
+          <a:p>
+            <a:r>
+              <a:rPr lang="en-GB" dirty="0" err="1" smtClean="0"/>
+              <a:t>dE</a:t>
+            </a:r>
+            <a:r>
+              <a:rPr lang="en-GB" dirty="0" smtClean="0"/>
+              <a:t>=170</a:t>
+            </a:r>
+            <a:endParaRPr lang="en-GB" dirty="0"/>
+          </a:p>
+        </p:txBody>
+      </p:sp>
+      <p:sp>
+        <p:nvSpPr>
+          <p:cNvPr id="8" name="TextBox 7"/>
+          <p:cNvSpPr txBox="1"/>
+          <p:nvPr/>
+        </p:nvSpPr>
+        <p:spPr>
+          <a:xfrm>
+            <a:off x="764704" y="251520"/>
+            <a:ext cx="885179" cy="369332"/>
+          </a:xfrm>
+          <a:prstGeom prst="rect">
+            <a:avLst/>
+          </a:prstGeom>
+          <a:noFill/>
+        </p:spPr>
+        <p:txBody>
+          <a:bodyPr wrap="none" rtlCol="0">
+            <a:spAutoFit/>
+          </a:bodyPr>
+          <a:lstStyle/>
+          <a:p>
+            <a:r>
+              <a:rPr lang="en-GB" dirty="0" err="1" smtClean="0"/>
+              <a:t>dE</a:t>
+            </a:r>
+            <a:r>
+              <a:rPr lang="en-GB" smtClean="0"/>
+              <a:t>=160</a:t>
+            </a:r>
+            <a:endParaRPr lang="en-GB" dirty="0"/>
+          </a:p>
+        </p:txBody>
+      </p:sp>
+    </p:spTree>
+    <p:extLst>
+      <p:ext uri="{BB962C8B-B14F-4D97-AF65-F5344CB8AC3E}">
+        <p14:creationId xmlns:p14="http://schemas.microsoft.com/office/powerpoint/2010/main" val="21399760"/>
       </p:ext>
     </p:extLst>
   </p:cSld>

</xml_diff>